<commit_message>
flashlight:: by sergio giraldo @ 20230307T1546CET, gpg signed
</commit_message>
<xml_diff>
--- a/powerpoint/ideas8.pptx
+++ b/powerpoint/ideas8.pptx
@@ -8,7 +8,7 @@
     <p:notesMasterId r:id="rId4"/>
   </p:notesMasterIdLst>
   <p:sldIdLst>
-    <p:sldId id="259" r:id="rId2"/>
+    <p:sldId id="262" r:id="rId2"/>
     <p:sldId id="260" r:id="rId3"/>
   </p:sldIdLst>
   <p:sldSz cx="12192000" cy="6858000"/>
@@ -3661,7 +3661,7 @@
         </p:nvSpPr>
         <p:spPr>
           <a:xfrm>
-            <a:off x="-11805560" y="-6933765"/>
+            <a:off x="-7600273" y="-5300908"/>
             <a:ext cx="27392546" cy="19186726"/>
           </a:xfrm>
           <a:custGeom>
@@ -3798,7 +3798,7 @@
     </p:spTree>
     <p:extLst>
       <p:ext uri="{BB962C8B-B14F-4D97-AF65-F5344CB8AC3E}">
-        <p14:creationId xmlns:p14="http://schemas.microsoft.com/office/powerpoint/2010/main" val="1354969464"/>
+        <p14:creationId xmlns:p14="http://schemas.microsoft.com/office/powerpoint/2010/main" val="2237457365"/>
       </p:ext>
     </p:extLst>
   </p:cSld>
@@ -3829,7 +3829,7 @@
                             </p:stCondLst>
                             <p:childTnLst>
                               <p:par>
-                                <p:cTn id="5" presetID="0" presetClass="path" presetSubtype="0" repeatCount="indefinite" accel="50000" autoRev="1" fill="remove" grpId="0" nodeType="withEffect">
+                                <p:cTn id="5" presetID="0" presetClass="path" presetSubtype="0" repeatCount="indefinite" autoRev="1" fill="hold" grpId="0" nodeType="withEffect">
                                   <p:stCondLst>
                                     <p:cond delay="0"/>
                                   </p:stCondLst>
@@ -3841,7 +3841,7 @@
                                     </p:cond>
                                   </p:endCondLst>
                                   <p:childTnLst>
-                                    <p:animMotion origin="layout" path="M 0 0 C 0.10156 -0.02592 -0.00248 -0.00115 0.26094 -0.01064 C 0.27799 -0.01134 0.29492 -0.01435 0.31198 -0.01597 L 0.43203 -0.01064 C 0.44401 -0.00995 0.45599 -0.00625 0.46797 -0.00532 C 0.50703 -0.00277 0.54596 -0.00185 0.58502 0 C 0.59101 0.00348 0.59778 0.0044 0.60299 0.01065 L 0.62109 0.03195 C 0.62643 0.06088 0.63008 0.06227 0.62409 0.09051 C 0.61901 0.11412 0.61901 0.10209 0.60898 0.11181 C 0.60273 0.11806 0.59791 0.12917 0.59101 0.13334 C 0.58502 0.13681 0.57825 0.13774 0.57304 0.14399 C 0.57005 0.14746 0.56732 0.15209 0.56406 0.15463 C 0.56028 0.15741 0.55599 0.15787 0.55208 0.15996 C 0.54896 0.16158 0.54609 0.16366 0.54297 0.16528 C 0.53502 0.16922 0.52682 0.1713 0.51901 0.17593 L 0.50104 0.18658 C 0.46081 0.18542 0.33424 0.18635 0.26693 0.17593 C 0.23932 0.17176 0.25859 0.17176 0.23698 0.16528 C 0.21901 0.15996 0.19414 0.15718 0.17695 0.15463 C 0.11901 0.15625 0.06094 0.1551 0.00299 0.15996 C -0.00339 0.16042 -0.01511 0.17061 -0.01511 0.17061 C -0.02188 0.20672 -0.02292 0.19352 -0.0181 0.22385 C -0.01719 0.2294 -0.01706 0.23542 -0.01511 0.23982 C -0.01276 0.24491 -0.00886 0.24653 -0.00612 0.2507 C 0.01953 0.28843 -0.01172 0.25093 0.01198 0.27199 C 0.01523 0.27477 0.01771 0.2801 0.02096 0.28264 C 0.03372 0.29283 0.03867 0.29237 0.05091 0.29862 C 0.06276 0.30463 0.06263 0.30834 0.07799 0.30926 C 0.1319 0.3125 0.18594 0.31274 0.23997 0.31459 L 0.47396 0.30926 C 0.50807 0.30926 0.54206 0.30996 0.57604 0.31459 C 0.58229 0.31551 0.58802 0.32176 0.59401 0.32524 L 0.60299 0.33056 C 0.61901 0.37315 0.59804 0.32176 0.61797 0.35718 C 0.62383 0.3676 0.62461 0.37616 0.62708 0.38936 C 0.62604 0.40394 0.62565 0.43149 0.62109 0.44792 C 0.6194 0.45371 0.61771 0.45973 0.61497 0.46389 C 0.60963 0.47246 0.60299 0.47824 0.597 0.48519 C 0.59401 0.48889 0.59153 0.49445 0.58802 0.49584 C 0.58008 0.49954 0.57187 0.50186 0.56406 0.50649 C 0.55807 0.51019 0.55221 0.51505 0.54596 0.51737 C 0.54101 0.51899 0.53607 0.52153 0.53099 0.52269 C 0.51393 0.52639 0.47109 0.53125 0.45599 0.53334 L 0.32995 0.52801 C 0.31015 0.52639 0.31706 0.52362 0.30299 0.51737 C 0.29804 0.51505 0.29297 0.51436 0.28802 0.51181 C 0.2819 0.50903 0.2763 0.50278 0.26992 0.50116 C 0.26328 0.49954 0.23841 0.49352 0.23099 0.49051 C 0.22786 0.48936 0.225 0.48658 0.222 0.48519 C 0.21706 0.48311 0.21185 0.48241 0.20703 0.47987 C 0.20091 0.47686 0.19518 0.47153 0.18893 0.46922 C 0.16198 0.45973 0.17903 0.46551 0.13802 0.45324 C 0.1319 0.45139 0.12578 0.45139 0.11992 0.44792 C 0.07721 0.42246 0.12174 0.44815 0.08997 0.43195 C 0.08698 0.43033 0.08398 0.42824 0.08099 0.42662 C 0.07695 0.42454 0.07291 0.42338 0.06901 0.4213 C 0.06588 0.41968 0.06302 0.41737 0.05989 0.41598 C 0.05495 0.41366 0.04987 0.4125 0.04492 0.41065 C 0.04088 0.40903 0.03698 0.40695 0.03294 0.40533 C 0.00898 0.41945 0.03893 0.40533 0.01497 0.40533 C -0.01107 0.40533 -0.03711 0.4088 -0.06302 0.41065 C -0.06602 0.41412 -0.06979 0.41621 -0.07201 0.4213 C -0.07409 0.4257 -0.075 0.43172 -0.075 0.43727 C -0.075 0.45787 -0.07253 0.46875 -0.06302 0.47987 C -0.06042 0.48311 -0.05677 0.48241 -0.05404 0.48519 C -0.04779 0.49144 -0.04206 0.49954 -0.03607 0.50649 L -0.0181 0.52801 L -0.00912 0.53866 C -0.00612 0.54213 -0.00352 0.54723 0 0.54931 C 0.01185 0.55625 0.02995 0.56783 0.04193 0.57061 L 0.06601 0.57593 C 0.09166 0.59121 0.05065 0.56783 0.09297 0.58658 C 0.09909 0.58936 0.10573 0.59098 0.11094 0.59723 C 0.11719 0.60463 0.12135 0.61158 0.1289 0.6132 C 0.14193 0.61621 0.15495 0.6169 0.16797 0.61852 C 0.18789 0.63033 0.17969 0.62917 0.19193 0.62917 " pathEditMode="relative" ptsTypes="AAAAAAAAAAAAAAAAAAAAAAAAAAAAAAAAAAAAAAAAAAAAAAAAAAAAAAAAAAAAAAAAAAAAAAAAAAAAA">
+                                    <p:animMotion origin="layout" path="M -0.26706 -0.48334 C 0.09479 -0.54838 0.45664 -0.61343 0.44284 -0.47848 C 0.42891 -0.34352 -0.22513 0.30092 -0.35013 0.32638 C -0.47513 0.35185 -0.42682 -0.20232 -0.30729 -0.32616 C -0.18763 -0.45 0.28659 -0.52616 0.36784 -0.41667 C 0.44909 -0.30695 0.31198 0.31296 0.18034 0.33125 C 0.04857 0.3493 -0.43086 -0.18635 -0.4224 -0.30695 C -0.41393 -0.42778 0.2276 -0.43797 0.23112 -0.39283 C 0.23477 -0.34746 -0.08307 -0.19167 -0.40104 -0.03565 " pathEditMode="relative" ptsTypes="AAAAAAAAA">
                                       <p:cBhvr>
                                         <p:cTn id="6" dur="10000" fill="hold"/>
                                         <p:tgtEl>

</xml_diff>